<commit_message>
appendici conduttività e sensitivity
</commit_message>
<xml_diff>
--- a/Presentazione.pptx
+++ b/Presentazione.pptx
@@ -5,7 +5,7 @@
     <p:sldMasterId id="2147483648" r:id="rId1"/>
   </p:sldMasterIdLst>
   <p:notesMasterIdLst>
-    <p:notesMasterId r:id="rId32"/>
+    <p:notesMasterId r:id="rId34"/>
   </p:notesMasterIdLst>
   <p:sldIdLst>
     <p:sldId id="256" r:id="rId2"/>
@@ -37,7 +37,9 @@
     <p:sldId id="264" r:id="rId28"/>
     <p:sldId id="268" r:id="rId29"/>
     <p:sldId id="269" r:id="rId30"/>
-    <p:sldId id="263" r:id="rId31"/>
+    <p:sldId id="286" r:id="rId31"/>
+    <p:sldId id="287" r:id="rId32"/>
+    <p:sldId id="263" r:id="rId33"/>
   </p:sldIdLst>
   <p:sldSz cx="9144000" cy="6858000" type="screen4x3"/>
   <p:notesSz cx="6858000" cy="9144000"/>
@@ -237,7 +239,7 @@
           <a:p>
             <a:fld id="{396644E0-6133-49E5-A3AD-BABC8DA91923}" type="datetimeFigureOut">
               <a:rPr lang="en-US" smtClean="0"/>
-              <a:t>6/24/2022</a:t>
+              <a:t>6/25/2022</a:t>
             </a:fld>
             <a:endParaRPr lang="en-US"/>
           </a:p>
@@ -4323,7 +4325,7 @@
                 <a:tabLst/>
                 <a:defRPr/>
               </a:pPr>
-              <a:t>30</a:t>
+              <a:t>32</a:t>
             </a:fld>
             <a:endParaRPr kumimoji="0" lang="en-US" sz="1200" b="0" i="0" u="none" strike="noStrike" kern="1200" cap="none" spc="0" normalizeH="0" baseline="0" noProof="0" dirty="0">
               <a:ln>
@@ -10407,7 +10409,7 @@
           <a:p>
             <a:fld id="{B96E2279-029F-964F-A5B1-8676BDA67CCA}" type="datetimeFigureOut">
               <a:rPr lang="it-IT" smtClean="0"/>
-              <a:t>24/06/2022</a:t>
+              <a:t>25/06/2022</a:t>
             </a:fld>
             <a:endParaRPr lang="it-IT"/>
           </a:p>
@@ -10609,7 +10611,7 @@
           <a:p>
             <a:fld id="{B96E2279-029F-964F-A5B1-8676BDA67CCA}" type="datetimeFigureOut">
               <a:rPr lang="it-IT" smtClean="0"/>
-              <a:t>24/06/2022</a:t>
+              <a:t>25/06/2022</a:t>
             </a:fld>
             <a:endParaRPr lang="it-IT"/>
           </a:p>
@@ -15524,7 +15526,7 @@
           <a:p>
             <a:fld id="{B96E2279-029F-964F-A5B1-8676BDA67CCA}" type="datetimeFigureOut">
               <a:rPr lang="it-IT" smtClean="0"/>
-              <a:t>24/06/2022</a:t>
+              <a:t>25/06/2022</a:t>
             </a:fld>
             <a:endParaRPr lang="it-IT"/>
           </a:p>
@@ -15833,7 +15835,7 @@
           <a:p>
             <a:fld id="{B96E2279-029F-964F-A5B1-8676BDA67CCA}" type="datetimeFigureOut">
               <a:rPr lang="it-IT" smtClean="0"/>
-              <a:t>24/06/2022</a:t>
+              <a:t>25/06/2022</a:t>
             </a:fld>
             <a:endParaRPr lang="it-IT"/>
           </a:p>
@@ -16276,7 +16278,7 @@
           <a:p>
             <a:fld id="{B96E2279-029F-964F-A5B1-8676BDA67CCA}" type="datetimeFigureOut">
               <a:rPr lang="it-IT" smtClean="0"/>
-              <a:t>24/06/2022</a:t>
+              <a:t>25/06/2022</a:t>
             </a:fld>
             <a:endParaRPr lang="it-IT"/>
           </a:p>
@@ -16417,7 +16419,7 @@
           <a:p>
             <a:fld id="{B96E2279-029F-964F-A5B1-8676BDA67CCA}" type="datetimeFigureOut">
               <a:rPr lang="it-IT" smtClean="0"/>
-              <a:t>24/06/2022</a:t>
+              <a:t>25/06/2022</a:t>
             </a:fld>
             <a:endParaRPr lang="it-IT"/>
           </a:p>
@@ -16536,7 +16538,7 @@
           <a:p>
             <a:fld id="{B96E2279-029F-964F-A5B1-8676BDA67CCA}" type="datetimeFigureOut">
               <a:rPr lang="it-IT" smtClean="0"/>
-              <a:t>24/06/2022</a:t>
+              <a:t>25/06/2022</a:t>
             </a:fld>
             <a:endParaRPr lang="it-IT"/>
           </a:p>
@@ -16835,7 +16837,7 @@
           <a:p>
             <a:fld id="{B96E2279-029F-964F-A5B1-8676BDA67CCA}" type="datetimeFigureOut">
               <a:rPr lang="it-IT" smtClean="0"/>
-              <a:t>24/06/2022</a:t>
+              <a:t>25/06/2022</a:t>
             </a:fld>
             <a:endParaRPr lang="it-IT"/>
           </a:p>
@@ -17114,7 +17116,7 @@
           <a:p>
             <a:fld id="{B96E2279-029F-964F-A5B1-8676BDA67CCA}" type="datetimeFigureOut">
               <a:rPr lang="it-IT" smtClean="0"/>
-              <a:t>24/06/2022</a:t>
+              <a:t>25/06/2022</a:t>
             </a:fld>
             <a:endParaRPr lang="it-IT"/>
           </a:p>
@@ -29458,6 +29460,216 @@
           </a:p>
         </p:txBody>
       </p:sp>
+      <p:pic>
+        <p:nvPicPr>
+          <p:cNvPr id="9" name="Immagine 8">
+            <a:extLst>
+              <a:ext uri="{FF2B5EF4-FFF2-40B4-BE49-F238E27FC236}">
+                <a16:creationId xmlns:a16="http://schemas.microsoft.com/office/drawing/2014/main" id="{996BF208-0BF0-7AD0-F994-9A74DC6F378B}"/>
+              </a:ext>
+            </a:extLst>
+          </p:cNvPr>
+          <p:cNvPicPr>
+            <a:picLocks noChangeAspect="1"/>
+          </p:cNvPicPr>
+          <p:nvPr/>
+        </p:nvPicPr>
+        <p:blipFill>
+          <a:blip r:embed="rId3"/>
+          <a:stretch>
+            <a:fillRect/>
+          </a:stretch>
+        </p:blipFill>
+        <p:spPr>
+          <a:xfrm>
+            <a:off x="4572001" y="1523416"/>
+            <a:ext cx="4572002" cy="3429001"/>
+          </a:xfrm>
+          <a:prstGeom prst="rect">
+            <a:avLst/>
+          </a:prstGeom>
+        </p:spPr>
+      </p:pic>
+      <p:pic>
+        <p:nvPicPr>
+          <p:cNvPr id="11" name="Immagine 10">
+            <a:extLst>
+              <a:ext uri="{FF2B5EF4-FFF2-40B4-BE49-F238E27FC236}">
+                <a16:creationId xmlns:a16="http://schemas.microsoft.com/office/drawing/2014/main" id="{074EC258-311C-EA87-A67C-C72774E07A74}"/>
+              </a:ext>
+            </a:extLst>
+          </p:cNvPr>
+          <p:cNvPicPr>
+            <a:picLocks noChangeAspect="1"/>
+          </p:cNvPicPr>
+          <p:nvPr/>
+        </p:nvPicPr>
+        <p:blipFill>
+          <a:blip r:embed="rId4"/>
+          <a:stretch>
+            <a:fillRect/>
+          </a:stretch>
+        </p:blipFill>
+        <p:spPr>
+          <a:xfrm>
+            <a:off x="0" y="1523417"/>
+            <a:ext cx="4572000" cy="3429000"/>
+          </a:xfrm>
+          <a:prstGeom prst="rect">
+            <a:avLst/>
+          </a:prstGeom>
+        </p:spPr>
+      </p:pic>
+      <p:sp>
+        <p:nvSpPr>
+          <p:cNvPr id="12" name="CasellaDiTesto 11">
+            <a:extLst>
+              <a:ext uri="{FF2B5EF4-FFF2-40B4-BE49-F238E27FC236}">
+                <a16:creationId xmlns:a16="http://schemas.microsoft.com/office/drawing/2014/main" id="{E52BC40F-E9F6-42CE-1067-420AC6C5EF37}"/>
+              </a:ext>
+            </a:extLst>
+          </p:cNvPr>
+          <p:cNvSpPr txBox="1"/>
+          <p:nvPr/>
+        </p:nvSpPr>
+        <p:spPr>
+          <a:xfrm>
+            <a:off x="512345" y="5127181"/>
+            <a:ext cx="3547310" cy="923330"/>
+          </a:xfrm>
+          <a:prstGeom prst="rect">
+            <a:avLst/>
+          </a:prstGeom>
+          <a:noFill/>
+        </p:spPr>
+        <p:txBody>
+          <a:bodyPr wrap="square" rtlCol="0">
+            <a:spAutoFit/>
+          </a:bodyPr>
+          <a:lstStyle/>
+          <a:p>
+            <a:pPr algn="ctr"/>
+            <a:r>
+              <a:rPr lang="it-IT" dirty="0"/>
+              <a:t>«Journal of </a:t>
+            </a:r>
+            <a:r>
+              <a:rPr lang="it-IT" dirty="0" err="1"/>
+              <a:t>Nuclear</a:t>
+            </a:r>
+            <a:r>
+              <a:rPr lang="it-IT" dirty="0"/>
+              <a:t> </a:t>
+            </a:r>
+            <a:r>
+              <a:rPr lang="it-IT" dirty="0" err="1"/>
+              <a:t>Materials</a:t>
+            </a:r>
+            <a:r>
+              <a:rPr lang="it-IT" dirty="0"/>
+              <a:t> (1995) – Thermal </a:t>
+            </a:r>
+            <a:r>
+              <a:rPr lang="it-IT" dirty="0" err="1"/>
+              <a:t>Conductivity</a:t>
+            </a:r>
+            <a:r>
+              <a:rPr lang="it-IT" dirty="0"/>
+              <a:t> of </a:t>
+            </a:r>
+            <a:r>
+              <a:rPr lang="it-IT" dirty="0" err="1"/>
+              <a:t>Zirconium</a:t>
+            </a:r>
+            <a:r>
+              <a:rPr lang="it-IT" dirty="0"/>
+              <a:t>» Fink - </a:t>
+            </a:r>
+            <a:r>
+              <a:rPr lang="it-IT" dirty="0" err="1"/>
+              <a:t>Leibowitz</a:t>
+            </a:r>
+            <a:endParaRPr lang="it-IT" dirty="0"/>
+          </a:p>
+        </p:txBody>
+      </p:sp>
+      <p:sp>
+        <p:nvSpPr>
+          <p:cNvPr id="13" name="CasellaDiTesto 12">
+            <a:extLst>
+              <a:ext uri="{FF2B5EF4-FFF2-40B4-BE49-F238E27FC236}">
+                <a16:creationId xmlns:a16="http://schemas.microsoft.com/office/drawing/2014/main" id="{B0042EB4-97E4-2CF6-4BAE-339DAD6CC167}"/>
+              </a:ext>
+            </a:extLst>
+          </p:cNvPr>
+          <p:cNvSpPr txBox="1"/>
+          <p:nvPr/>
+        </p:nvSpPr>
+        <p:spPr>
+          <a:xfrm>
+            <a:off x="5272978" y="5169221"/>
+            <a:ext cx="3170048" cy="646331"/>
+          </a:xfrm>
+          <a:prstGeom prst="rect">
+            <a:avLst/>
+          </a:prstGeom>
+          <a:noFill/>
+        </p:spPr>
+        <p:txBody>
+          <a:bodyPr wrap="square" rtlCol="0">
+            <a:spAutoFit/>
+          </a:bodyPr>
+          <a:lstStyle/>
+          <a:p>
+            <a:pPr algn="ctr"/>
+            <a:r>
+              <a:rPr lang="it-IT" dirty="0" err="1"/>
+              <a:t>Klimenko</a:t>
+            </a:r>
+            <a:r>
+              <a:rPr lang="it-IT" dirty="0"/>
+              <a:t> - </a:t>
+            </a:r>
+            <a:r>
+              <a:rPr lang="it-IT" dirty="0" err="1"/>
+              <a:t>Zorin</a:t>
+            </a:r>
+            <a:r>
+              <a:rPr lang="it-IT" dirty="0"/>
+              <a:t> </a:t>
+            </a:r>
+            <a:r>
+              <a:rPr lang="it-IT" dirty="0" err="1"/>
+              <a:t>correlation</a:t>
+            </a:r>
+            <a:r>
+              <a:rPr lang="it-IT" dirty="0"/>
+              <a:t> for UO</a:t>
+            </a:r>
+            <a:r>
+              <a:rPr lang="it-IT" baseline="-25000" dirty="0"/>
+              <a:t>2</a:t>
+            </a:r>
+            <a:r>
+              <a:rPr lang="it-IT" dirty="0"/>
+              <a:t> </a:t>
+            </a:r>
+            <a:r>
+              <a:rPr lang="it-IT" dirty="0" err="1"/>
+              <a:t>thermal</a:t>
+            </a:r>
+            <a:r>
+              <a:rPr lang="it-IT" dirty="0"/>
+              <a:t> </a:t>
+            </a:r>
+            <a:r>
+              <a:rPr lang="it-IT" dirty="0" err="1"/>
+              <a:t>conductivity</a:t>
+            </a:r>
+            <a:endParaRPr lang="it-IT" dirty="0"/>
+          </a:p>
+        </p:txBody>
+      </p:sp>
     </p:spTree>
     <p:extLst>
       <p:ext uri="{BB962C8B-B14F-4D97-AF65-F5344CB8AC3E}">
@@ -29728,6 +29940,230 @@
 </file>
 
 <file path=ppt/slides/slide30.xml><?xml version="1.0" encoding="utf-8"?>
+<p:sld xmlns:a="http://schemas.openxmlformats.org/drawingml/2006/main" xmlns:r="http://schemas.openxmlformats.org/officeDocument/2006/relationships" xmlns:p="http://schemas.openxmlformats.org/presentationml/2006/main">
+  <p:cSld>
+    <p:spTree>
+      <p:nvGrpSpPr>
+        <p:cNvPr id="1" name=""/>
+        <p:cNvGrpSpPr/>
+        <p:nvPr/>
+      </p:nvGrpSpPr>
+      <p:grpSpPr>
+        <a:xfrm>
+          <a:off x="0" y="0"/>
+          <a:ext cx="0" cy="0"/>
+          <a:chOff x="0" y="0"/>
+          <a:chExt cx="0" cy="0"/>
+        </a:xfrm>
+      </p:grpSpPr>
+      <p:sp>
+        <p:nvSpPr>
+          <p:cNvPr id="2" name="Titolo 1">
+            <a:extLst>
+              <a:ext uri="{FF2B5EF4-FFF2-40B4-BE49-F238E27FC236}">
+                <a16:creationId xmlns:a16="http://schemas.microsoft.com/office/drawing/2014/main" id="{FBE4BC22-9012-1688-A191-279247BE3B05}"/>
+              </a:ext>
+            </a:extLst>
+          </p:cNvPr>
+          <p:cNvSpPr>
+            <a:spLocks noGrp="1"/>
+          </p:cNvSpPr>
+          <p:nvPr>
+            <p:ph type="title"/>
+          </p:nvPr>
+        </p:nvSpPr>
+        <p:spPr>
+          <a:xfrm>
+            <a:off x="288521" y="184145"/>
+            <a:ext cx="8581043" cy="840400"/>
+          </a:xfrm>
+        </p:spPr>
+        <p:txBody>
+          <a:bodyPr>
+            <a:normAutofit/>
+          </a:bodyPr>
+          <a:lstStyle/>
+          <a:p>
+            <a:pPr algn="ctr"/>
+            <a:r>
+              <a:rPr lang="it-IT" sz="2800" dirty="0"/>
+              <a:t>APPENDICE F – SENSITIVITY ANALYSIS</a:t>
+            </a:r>
+          </a:p>
+        </p:txBody>
+      </p:sp>
+      <p:pic>
+        <p:nvPicPr>
+          <p:cNvPr id="5" name="Segnaposto contenuto 4">
+            <a:extLst>
+              <a:ext uri="{FF2B5EF4-FFF2-40B4-BE49-F238E27FC236}">
+                <a16:creationId xmlns:a16="http://schemas.microsoft.com/office/drawing/2014/main" id="{C0E0BBE9-29C5-0C26-D678-1DA57B48EBE5}"/>
+              </a:ext>
+            </a:extLst>
+          </p:cNvPr>
+          <p:cNvPicPr>
+            <a:picLocks noGrp="1" noChangeAspect="1"/>
+          </p:cNvPicPr>
+          <p:nvPr>
+            <p:ph idx="1"/>
+          </p:nvPr>
+        </p:nvPicPr>
+        <p:blipFill rotWithShape="1">
+          <a:blip r:embed="rId2"/>
+          <a:srcRect t="3921" r="7177" b="3678"/>
+          <a:stretch/>
+        </p:blipFill>
+        <p:spPr>
+          <a:xfrm>
+            <a:off x="1606382" y="1283403"/>
+            <a:ext cx="5931236" cy="4802088"/>
+          </a:xfrm>
+        </p:spPr>
+      </p:pic>
+    </p:spTree>
+    <p:extLst>
+      <p:ext uri="{BB962C8B-B14F-4D97-AF65-F5344CB8AC3E}">
+        <p14:creationId xmlns:p14="http://schemas.microsoft.com/office/powerpoint/2010/main" val="3361109696"/>
+      </p:ext>
+    </p:extLst>
+  </p:cSld>
+  <p:clrMapOvr>
+    <a:masterClrMapping/>
+  </p:clrMapOvr>
+</p:sld>
+</file>
+
+<file path=ppt/slides/slide31.xml><?xml version="1.0" encoding="utf-8"?>
+<p:sld xmlns:a="http://schemas.openxmlformats.org/drawingml/2006/main" xmlns:r="http://schemas.openxmlformats.org/officeDocument/2006/relationships" xmlns:p="http://schemas.openxmlformats.org/presentationml/2006/main">
+  <p:cSld>
+    <p:spTree>
+      <p:nvGrpSpPr>
+        <p:cNvPr id="1" name=""/>
+        <p:cNvGrpSpPr/>
+        <p:nvPr/>
+      </p:nvGrpSpPr>
+      <p:grpSpPr>
+        <a:xfrm>
+          <a:off x="0" y="0"/>
+          <a:ext cx="0" cy="0"/>
+          <a:chOff x="0" y="0"/>
+          <a:chExt cx="0" cy="0"/>
+        </a:xfrm>
+      </p:grpSpPr>
+      <p:sp>
+        <p:nvSpPr>
+          <p:cNvPr id="2" name="Titolo 1">
+            <a:extLst>
+              <a:ext uri="{FF2B5EF4-FFF2-40B4-BE49-F238E27FC236}">
+                <a16:creationId xmlns:a16="http://schemas.microsoft.com/office/drawing/2014/main" id="{DB00F0E1-22E7-A084-B672-DE5FBE0E92AE}"/>
+              </a:ext>
+            </a:extLst>
+          </p:cNvPr>
+          <p:cNvSpPr>
+            <a:spLocks noGrp="1"/>
+          </p:cNvSpPr>
+          <p:nvPr>
+            <p:ph type="title"/>
+          </p:nvPr>
+        </p:nvSpPr>
+        <p:spPr>
+          <a:xfrm>
+            <a:off x="328541" y="384283"/>
+            <a:ext cx="8581043" cy="840400"/>
+          </a:xfrm>
+        </p:spPr>
+        <p:txBody>
+          <a:bodyPr>
+            <a:normAutofit/>
+          </a:bodyPr>
+          <a:lstStyle/>
+          <a:p>
+            <a:pPr algn="ctr"/>
+            <a:r>
+              <a:rPr lang="it-IT" sz="2800" dirty="0"/>
+              <a:t>APPENDICE F – SENSITIVITY ANALYSIS</a:t>
+            </a:r>
+            <a:endParaRPr lang="it-IT" sz="2400" dirty="0"/>
+          </a:p>
+        </p:txBody>
+      </p:sp>
+      <p:sp>
+        <p:nvSpPr>
+          <p:cNvPr id="3" name="Segnaposto contenuto 2">
+            <a:extLst>
+              <a:ext uri="{FF2B5EF4-FFF2-40B4-BE49-F238E27FC236}">
+                <a16:creationId xmlns:a16="http://schemas.microsoft.com/office/drawing/2014/main" id="{D0DAA530-EF03-F119-4A92-034C45E00F6C}"/>
+              </a:ext>
+            </a:extLst>
+          </p:cNvPr>
+          <p:cNvSpPr>
+            <a:spLocks noGrp="1"/>
+          </p:cNvSpPr>
+          <p:nvPr>
+            <p:ph idx="1"/>
+          </p:nvPr>
+        </p:nvSpPr>
+        <p:spPr>
+          <a:xfrm>
+            <a:off x="457200" y="1368972"/>
+            <a:ext cx="8323726" cy="4525963"/>
+          </a:xfrm>
+        </p:spPr>
+        <p:txBody>
+          <a:bodyPr/>
+          <a:lstStyle/>
+          <a:p>
+            <a:pPr algn="ctr"/>
+            <a:r>
+              <a:rPr lang="it-IT" dirty="0"/>
+              <a:t>ANALISI CONDUTTIVITA’ TERMICA DEI SOLIDI</a:t>
+            </a:r>
+          </a:p>
+        </p:txBody>
+      </p:sp>
+      <p:pic>
+        <p:nvPicPr>
+          <p:cNvPr id="4" name="Immagine 3">
+            <a:extLst>
+              <a:ext uri="{FF2B5EF4-FFF2-40B4-BE49-F238E27FC236}">
+                <a16:creationId xmlns:a16="http://schemas.microsoft.com/office/drawing/2014/main" id="{76C22081-1DC0-E353-37E0-7562EE30CF9C}"/>
+              </a:ext>
+            </a:extLst>
+          </p:cNvPr>
+          <p:cNvPicPr>
+            <a:picLocks noChangeAspect="1"/>
+          </p:cNvPicPr>
+          <p:nvPr/>
+        </p:nvPicPr>
+        <p:blipFill rotWithShape="1">
+          <a:blip r:embed="rId2"/>
+          <a:srcRect l="8957" t="5016" r="7404" b="34005"/>
+          <a:stretch/>
+        </p:blipFill>
+        <p:spPr>
+          <a:xfrm>
+            <a:off x="1147465" y="1977844"/>
+            <a:ext cx="6849069" cy="4061380"/>
+          </a:xfrm>
+          <a:prstGeom prst="rect">
+            <a:avLst/>
+          </a:prstGeom>
+        </p:spPr>
+      </p:pic>
+    </p:spTree>
+    <p:extLst>
+      <p:ext uri="{BB962C8B-B14F-4D97-AF65-F5344CB8AC3E}">
+        <p14:creationId xmlns:p14="http://schemas.microsoft.com/office/powerpoint/2010/main" val="2883028997"/>
+      </p:ext>
+    </p:extLst>
+  </p:cSld>
+  <p:clrMapOvr>
+    <a:masterClrMapping/>
+  </p:clrMapOvr>
+</p:sld>
+</file>
+
+<file path=ppt/slides/slide32.xml><?xml version="1.0" encoding="utf-8"?>
 <p:sld xmlns:a="http://schemas.openxmlformats.org/drawingml/2006/main" xmlns:r="http://schemas.openxmlformats.org/officeDocument/2006/relationships" xmlns:p="http://schemas.openxmlformats.org/presentationml/2006/main">
   <p:cSld>
     <p:spTree>

</xml_diff>